<commit_message>
se agrega diagrama de base de datos
base de datos
</commit_message>
<xml_diff>
--- a/manuales/Manual de presentacion de proyecto.pptx
+++ b/manuales/Manual de presentacion de proyecto.pptx
@@ -297,7 +297,7 @@
       <p15:sldGuideLst xmlns:p15="http://schemas.microsoft.com/office/powerpoint/2012/main"/>
     </p:ext>
     <p:ext uri="GoogleSlidesCustomDataVersion2">
-      <go:slidesCustomData xmlns="" xmlns:mc="http://schemas.openxmlformats.org/markup-compatibility/2006" xmlns:mv="urn:schemas-microsoft-com:mac:vml" xmlns:c="http://schemas.openxmlformats.org/drawingml/2006/chart" xmlns:dgm="http://schemas.openxmlformats.org/drawingml/2006/diagram" xmlns:o="urn:schemas-microsoft-com:office:office" xmlns:v="urn:schemas-microsoft-com:vml" xmlns:pvml="urn:schemas-microsoft-com:office:powerpoint" xmlns:com="http://schemas.openxmlformats.org/drawingml/2006/compatibility" xmlns:p14="http://schemas.microsoft.com/office/powerpoint/2010/main" xmlns:p15="http://schemas.microsoft.com/office/powerpoint/2012/main" xmlns:ahyp="http://schemas.microsoft.com/office/drawing/2018/hyperlinkcolor" xmlns:go="http://customooxmlschemas.google.com/" r:id="rId158" roundtripDataSignature="AMtx7mh9cBwuomw2KhP3+gywVhm2hcJ6IQ=="/>
+      <go:slidesCustomData xmlns:go="http://customooxmlschemas.google.com/" xmlns:ahyp="http://schemas.microsoft.com/office/drawing/2018/hyperlinkcolor" xmlns:p15="http://schemas.microsoft.com/office/powerpoint/2012/main" xmlns:p14="http://schemas.microsoft.com/office/powerpoint/2010/main" xmlns:com="http://schemas.openxmlformats.org/drawingml/2006/compatibility" xmlns:pvml="urn:schemas-microsoft-com:office:powerpoint" xmlns:v="urn:schemas-microsoft-com:vml" xmlns:o="urn:schemas-microsoft-com:office:office" xmlns:dgm="http://schemas.openxmlformats.org/drawingml/2006/diagram" xmlns:c="http://schemas.openxmlformats.org/drawingml/2006/chart" xmlns:mv="urn:schemas-microsoft-com:mac:vml" xmlns:mc="http://schemas.openxmlformats.org/markup-compatibility/2006" xmlns="" r:id="rId158" roundtripDataSignature="AMtx7mh9cBwuomw2KhP3+gywVhm2hcJ6IQ=="/>
     </p:ext>
   </p:extLst>
 </p:presentation>
@@ -31750,8 +31750,8 @@
         </p:nvSpPr>
         <p:spPr>
           <a:xfrm>
-            <a:off x="744675" y="1536174"/>
-            <a:ext cx="9762299" cy="1015663"/>
+            <a:off x="329038" y="5609410"/>
+            <a:ext cx="9762299" cy="707886"/>
           </a:xfrm>
           <a:prstGeom prst="rect">
             <a:avLst/>
@@ -31762,23 +31762,6 @@
             <a:spAutoFit/>
           </a:bodyPr>
           <a:lstStyle/>
-          <a:p>
-            <a:pPr lvl="0">
-              <a:buClrTx/>
-              <a:defRPr/>
-            </a:pPr>
-            <a:r>
-              <a:rPr lang="es-ES" sz="2000" kern="1200" dirty="0">
-                <a:solidFill>
-                  <a:prstClr val="black"/>
-                </a:solidFill>
-                <a:latin typeface="Work Sans Light" pitchFamily="2" charset="77"/>
-                <a:ea typeface="+mn-ea"/>
-                <a:cs typeface="+mn-cs"/>
-              </a:rPr>
-              <a:t>Modelo relacional de la base de datos…(imagen)</a:t>
-            </a:r>
-          </a:p>
           <a:p>
             <a:pPr lvl="0">
               <a:buClrTx/>
@@ -31812,6 +31795,36 @@
           </a:p>
         </p:txBody>
       </p:sp>
+      <p:pic>
+        <p:nvPicPr>
+          <p:cNvPr id="3" name="Imagen 2">
+            <a:extLst>
+              <a:ext uri="{FF2B5EF4-FFF2-40B4-BE49-F238E27FC236}">
+                <a16:creationId xmlns:a16="http://schemas.microsoft.com/office/drawing/2014/main" id="{0D0664F4-5E81-42A6-93D9-2B4C7017BE1B}"/>
+              </a:ext>
+            </a:extLst>
+          </p:cNvPr>
+          <p:cNvPicPr>
+            <a:picLocks noChangeAspect="1"/>
+          </p:cNvPicPr>
+          <p:nvPr/>
+        </p:nvPicPr>
+        <p:blipFill>
+          <a:blip r:embed="rId3"/>
+          <a:stretch>
+            <a:fillRect/>
+          </a:stretch>
+        </p:blipFill>
+        <p:spPr>
+          <a:xfrm>
+            <a:off x="329038" y="1330283"/>
+            <a:ext cx="8310940" cy="4279127"/>
+          </a:xfrm>
+          <a:prstGeom prst="rect">
+            <a:avLst/>
+          </a:prstGeom>
+        </p:spPr>
+      </p:pic>
     </p:spTree>
     <p:extLst>
       <p:ext uri="{BB962C8B-B14F-4D97-AF65-F5344CB8AC3E}">

</xml_diff>